<commit_message>
Nieuwe werkende sjablonen + temp cache fix
</commit_message>
<xml_diff>
--- a/sjablonen/SjabloonBloemrijk.pptx
+++ b/sjablonen/SjabloonBloemrijk.pptx
@@ -6,6 +6,10 @@
   </p:sldMasterIdLst>
   <p:sldIdLst>
     <p:sldId id="256" r:id="rId2"/>
+    <p:sldId id="257" r:id="rId3"/>
+    <p:sldId id="258" r:id="rId4"/>
+    <p:sldId id="259" r:id="rId5"/>
+    <p:sldId id="260" r:id="rId6"/>
   </p:sldIdLst>
   <p:sldSz cx="12192000" cy="6858000"/>
   <p:notesSz cx="6858000" cy="9144000"/>
@@ -104,6 +108,11 @@
       </a:defRPr>
     </a:lvl9pPr>
   </p:defaultTextStyle>
+  <p:extLst>
+    <p:ext uri="{EFAFB233-063F-42B5-8137-9DF3F51BA10A}">
+      <p15:sldGuideLst xmlns:p15="http://schemas.microsoft.com/office/powerpoint/2012/main"/>
+    </p:ext>
+  </p:extLst>
 </p:presentation>
 </file>
 
@@ -1024,29 +1033,21 @@
       </p:grpSpPr>
       <p:sp>
         <p:nvSpPr>
-          <p:cNvPr id="2" name="Titel 1">
-            <a:extLst>
-              <a:ext uri="{FF2B5EF4-FFF2-40B4-BE49-F238E27FC236}">
-                <a16:creationId xmlns:a16="http://schemas.microsoft.com/office/drawing/2014/main" id="{67D46CE5-8FE6-0016-A291-6F667C3A842D}"/>
-              </a:ext>
-            </a:extLst>
-          </p:cNvPr>
-          <p:cNvSpPr>
-            <a:spLocks noGrp="1"/>
-          </p:cNvSpPr>
-          <p:nvPr>
-            <p:ph type="ctrTitle" idx="4294967295"/>
-          </p:nvPr>
-        </p:nvSpPr>
-        <p:spPr>
-          <a:xfrm>
-            <a:off x="1524000" y="1122363"/>
-            <a:ext cx="9144000" cy="2387600"/>
-          </a:xfrm>
-          <a:prstGeom prst="rect">
-            <a:avLst/>
-          </a:prstGeom>
-        </p:spPr>
+          <p:cNvPr id="4" name="Naam+geboortedatum+overleidensdatum">
+            <a:extLst>
+              <a:ext uri="{FF2B5EF4-FFF2-40B4-BE49-F238E27FC236}">
+                <a16:creationId xmlns:a16="http://schemas.microsoft.com/office/drawing/2014/main" id="{7CB2BDA2-A889-371D-9B30-820F8C29CCF6}"/>
+              </a:ext>
+            </a:extLst>
+          </p:cNvPr>
+          <p:cNvSpPr>
+            <a:spLocks noGrp="1" noRot="1" noMove="1" noResize="1" noEditPoints="1" noAdjustHandles="1" noChangeArrowheads="1" noChangeShapeType="1"/>
+          </p:cNvSpPr>
+          <p:nvPr>
+            <p:ph type="subTitle" idx="1"/>
+          </p:nvPr>
+        </p:nvSpPr>
+        <p:spPr/>
         <p:txBody>
           <a:bodyPr/>
           <a:lstStyle/>
@@ -1057,41 +1058,290 @@
       </p:sp>
       <p:sp>
         <p:nvSpPr>
-          <p:cNvPr id="3" name="Ondertitel 2">
-            <a:extLst>
-              <a:ext uri="{FF2B5EF4-FFF2-40B4-BE49-F238E27FC236}">
-                <a16:creationId xmlns:a16="http://schemas.microsoft.com/office/drawing/2014/main" id="{711CA86D-C86E-7527-223B-9546E31A03C6}"/>
-              </a:ext>
-            </a:extLst>
-          </p:cNvPr>
-          <p:cNvSpPr>
-            <a:spLocks noGrp="1"/>
-          </p:cNvSpPr>
-          <p:nvPr>
-            <p:ph type="subTitle" idx="4294967295"/>
-          </p:nvPr>
-        </p:nvSpPr>
-        <p:spPr>
-          <a:xfrm>
-            <a:off x="1524000" y="3602038"/>
-            <a:ext cx="9144000" cy="1655762"/>
-          </a:xfrm>
-          <a:prstGeom prst="rect">
-            <a:avLst/>
-          </a:prstGeom>
-        </p:spPr>
-        <p:txBody>
-          <a:bodyPr/>
-          <a:lstStyle/>
-          <a:p>
-            <a:endParaRPr lang="nl-NL"/>
-          </a:p>
-        </p:txBody>
+          <p:cNvPr id="5" name="foto01">
+            <a:extLst>
+              <a:ext uri="{FF2B5EF4-FFF2-40B4-BE49-F238E27FC236}">
+                <a16:creationId xmlns:a16="http://schemas.microsoft.com/office/drawing/2014/main" id="{2E246D92-B2E5-620E-D262-95A8783C1DB2}"/>
+              </a:ext>
+            </a:extLst>
+          </p:cNvPr>
+          <p:cNvSpPr>
+            <a:spLocks noGrp="1" noRot="1" noMove="1" noResize="1" noEditPoints="1" noAdjustHandles="1" noChangeArrowheads="1" noChangeShapeType="1"/>
+          </p:cNvSpPr>
+          <p:nvPr>
+            <p:ph type="pic" sz="quarter" idx="10"/>
+          </p:nvPr>
+        </p:nvSpPr>
+        <p:spPr/>
       </p:sp>
     </p:spTree>
     <p:extLst>
       <p:ext uri="{BB962C8B-B14F-4D97-AF65-F5344CB8AC3E}">
         <p14:creationId xmlns:p14="http://schemas.microsoft.com/office/powerpoint/2010/main" val="1412347847"/>
+      </p:ext>
+    </p:extLst>
+  </p:cSld>
+  <p:clrMapOvr>
+    <a:masterClrMapping/>
+  </p:clrMapOvr>
+</p:sld>
+</file>
+
+<file path=ppt/slides/slide2.xml><?xml version="1.0" encoding="utf-8"?>
+<p:sld xmlns:a="http://schemas.openxmlformats.org/drawingml/2006/main" xmlns:r="http://schemas.openxmlformats.org/officeDocument/2006/relationships" xmlns:p="http://schemas.openxmlformats.org/presentationml/2006/main">
+  <p:cSld>
+    <p:spTree>
+      <p:nvGrpSpPr>
+        <p:cNvPr id="1" name=""/>
+        <p:cNvGrpSpPr/>
+        <p:nvPr/>
+      </p:nvGrpSpPr>
+      <p:grpSpPr>
+        <a:xfrm>
+          <a:off x="0" y="0"/>
+          <a:ext cx="0" cy="0"/>
+          <a:chOff x="0" y="0"/>
+          <a:chExt cx="0" cy="0"/>
+        </a:xfrm>
+      </p:grpSpPr>
+      <p:sp>
+        <p:nvSpPr>
+          <p:cNvPr id="8" name="foto03">
+            <a:extLst>
+              <a:ext uri="{FF2B5EF4-FFF2-40B4-BE49-F238E27FC236}">
+                <a16:creationId xmlns:a16="http://schemas.microsoft.com/office/drawing/2014/main" id="{B0F0A3F3-6B21-7916-ED7F-000E23633DD1}"/>
+              </a:ext>
+            </a:extLst>
+          </p:cNvPr>
+          <p:cNvSpPr>
+            <a:spLocks/>
+          </p:cNvSpPr>
+          <p:nvPr>
+            <p:ph type="pic" sz="quarter" idx="11"/>
+          </p:nvPr>
+        </p:nvSpPr>
+        <p:spPr/>
+      </p:sp>
+      <p:sp>
+        <p:nvSpPr>
+          <p:cNvPr id="7" name="foto02">
+            <a:extLst>
+              <a:ext uri="{FF2B5EF4-FFF2-40B4-BE49-F238E27FC236}">
+                <a16:creationId xmlns:a16="http://schemas.microsoft.com/office/drawing/2014/main" id="{72A35E27-10F2-BFA2-7E16-A1FC35707DCB}"/>
+              </a:ext>
+            </a:extLst>
+          </p:cNvPr>
+          <p:cNvSpPr>
+            <a:spLocks/>
+          </p:cNvSpPr>
+          <p:nvPr>
+            <p:ph type="pic" sz="quarter" idx="10"/>
+          </p:nvPr>
+        </p:nvSpPr>
+        <p:spPr/>
+      </p:sp>
+    </p:spTree>
+    <p:extLst>
+      <p:ext uri="{BB962C8B-B14F-4D97-AF65-F5344CB8AC3E}">
+        <p14:creationId xmlns:p14="http://schemas.microsoft.com/office/powerpoint/2010/main" val="2388083224"/>
+      </p:ext>
+    </p:extLst>
+  </p:cSld>
+  <p:clrMapOvr>
+    <a:masterClrMapping/>
+  </p:clrMapOvr>
+</p:sld>
+</file>
+
+<file path=ppt/slides/slide3.xml><?xml version="1.0" encoding="utf-8"?>
+<p:sld xmlns:a="http://schemas.openxmlformats.org/drawingml/2006/main" xmlns:r="http://schemas.openxmlformats.org/officeDocument/2006/relationships" xmlns:p="http://schemas.openxmlformats.org/presentationml/2006/main">
+  <p:cSld>
+    <p:spTree>
+      <p:nvGrpSpPr>
+        <p:cNvPr id="1" name=""/>
+        <p:cNvGrpSpPr/>
+        <p:nvPr/>
+      </p:nvGrpSpPr>
+      <p:grpSpPr>
+        <a:xfrm>
+          <a:off x="0" y="0"/>
+          <a:ext cx="0" cy="0"/>
+          <a:chOff x="0" y="0"/>
+          <a:chExt cx="0" cy="0"/>
+        </a:xfrm>
+      </p:grpSpPr>
+      <p:sp>
+        <p:nvSpPr>
+          <p:cNvPr id="6" name="foto06">
+            <a:extLst>
+              <a:ext uri="{FF2B5EF4-FFF2-40B4-BE49-F238E27FC236}">
+                <a16:creationId xmlns:a16="http://schemas.microsoft.com/office/drawing/2014/main" id="{01CAC790-9379-ED9E-F668-D0932F2A143A}"/>
+              </a:ext>
+            </a:extLst>
+          </p:cNvPr>
+          <p:cNvSpPr>
+            <a:spLocks noGrp="1" noRot="1" noMove="1" noResize="1" noEditPoints="1" noAdjustHandles="1" noChangeArrowheads="1" noChangeShapeType="1"/>
+          </p:cNvSpPr>
+          <p:nvPr>
+            <p:ph type="pic" sz="quarter" idx="12"/>
+          </p:nvPr>
+        </p:nvSpPr>
+        <p:spPr/>
+      </p:sp>
+      <p:sp>
+        <p:nvSpPr>
+          <p:cNvPr id="5" name="foto05">
+            <a:extLst>
+              <a:ext uri="{FF2B5EF4-FFF2-40B4-BE49-F238E27FC236}">
+                <a16:creationId xmlns:a16="http://schemas.microsoft.com/office/drawing/2014/main" id="{C058951D-D671-5A19-428C-773591372FA5}"/>
+              </a:ext>
+            </a:extLst>
+          </p:cNvPr>
+          <p:cNvSpPr>
+            <a:spLocks noGrp="1" noRot="1" noMove="1" noResize="1" noEditPoints="1" noAdjustHandles="1" noChangeArrowheads="1" noChangeShapeType="1"/>
+          </p:cNvSpPr>
+          <p:nvPr>
+            <p:ph type="pic" sz="quarter" idx="11"/>
+          </p:nvPr>
+        </p:nvSpPr>
+        <p:spPr/>
+      </p:sp>
+      <p:sp>
+        <p:nvSpPr>
+          <p:cNvPr id="4" name="foto04">
+            <a:extLst>
+              <a:ext uri="{FF2B5EF4-FFF2-40B4-BE49-F238E27FC236}">
+                <a16:creationId xmlns:a16="http://schemas.microsoft.com/office/drawing/2014/main" id="{7410DAF8-3EAF-9422-13D8-65CC2DFBEA13}"/>
+              </a:ext>
+            </a:extLst>
+          </p:cNvPr>
+          <p:cNvSpPr>
+            <a:spLocks noGrp="1" noRot="1" noMove="1" noResize="1" noEditPoints="1" noAdjustHandles="1" noChangeArrowheads="1" noChangeShapeType="1"/>
+          </p:cNvSpPr>
+          <p:nvPr>
+            <p:ph type="pic" sz="quarter" idx="10"/>
+          </p:nvPr>
+        </p:nvSpPr>
+        <p:spPr/>
+      </p:sp>
+    </p:spTree>
+    <p:extLst>
+      <p:ext uri="{BB962C8B-B14F-4D97-AF65-F5344CB8AC3E}">
+        <p14:creationId xmlns:p14="http://schemas.microsoft.com/office/powerpoint/2010/main" val="1976271580"/>
+      </p:ext>
+    </p:extLst>
+  </p:cSld>
+  <p:clrMapOvr>
+    <a:masterClrMapping/>
+  </p:clrMapOvr>
+</p:sld>
+</file>
+
+<file path=ppt/slides/slide4.xml><?xml version="1.0" encoding="utf-8"?>
+<p:sld xmlns:a="http://schemas.openxmlformats.org/drawingml/2006/main" xmlns:r="http://schemas.openxmlformats.org/officeDocument/2006/relationships" xmlns:p="http://schemas.openxmlformats.org/presentationml/2006/main">
+  <p:cSld>
+    <p:spTree>
+      <p:nvGrpSpPr>
+        <p:cNvPr id="1" name=""/>
+        <p:cNvGrpSpPr/>
+        <p:nvPr/>
+      </p:nvGrpSpPr>
+      <p:grpSpPr>
+        <a:xfrm>
+          <a:off x="0" y="0"/>
+          <a:ext cx="0" cy="0"/>
+          <a:chOff x="0" y="0"/>
+          <a:chExt cx="0" cy="0"/>
+        </a:xfrm>
+      </p:grpSpPr>
+      <p:sp>
+        <p:nvSpPr>
+          <p:cNvPr id="7" name="foto08">
+            <a:extLst>
+              <a:ext uri="{FF2B5EF4-FFF2-40B4-BE49-F238E27FC236}">
+                <a16:creationId xmlns:a16="http://schemas.microsoft.com/office/drawing/2014/main" id="{268A0807-B6E6-D5D6-41FA-A39A06F1889E}"/>
+              </a:ext>
+            </a:extLst>
+          </p:cNvPr>
+          <p:cNvSpPr>
+            <a:spLocks noGrp="1" noRot="1" noMove="1" noResize="1" noEditPoints="1" noAdjustHandles="1" noChangeArrowheads="1" noChangeShapeType="1"/>
+          </p:cNvSpPr>
+          <p:nvPr>
+            <p:ph type="pic" sz="quarter" idx="11"/>
+          </p:nvPr>
+        </p:nvSpPr>
+        <p:spPr/>
+      </p:sp>
+      <p:sp>
+        <p:nvSpPr>
+          <p:cNvPr id="6" name="foto07">
+            <a:extLst>
+              <a:ext uri="{FF2B5EF4-FFF2-40B4-BE49-F238E27FC236}">
+                <a16:creationId xmlns:a16="http://schemas.microsoft.com/office/drawing/2014/main" id="{A51EBFC0-AE4E-5516-6863-250296B09057}"/>
+              </a:ext>
+            </a:extLst>
+          </p:cNvPr>
+          <p:cNvSpPr>
+            <a:spLocks noGrp="1" noRot="1" noMove="1" noResize="1" noEditPoints="1" noAdjustHandles="1" noChangeArrowheads="1" noChangeShapeType="1"/>
+          </p:cNvSpPr>
+          <p:nvPr>
+            <p:ph type="pic" sz="quarter" idx="10"/>
+          </p:nvPr>
+        </p:nvSpPr>
+        <p:spPr/>
+      </p:sp>
+    </p:spTree>
+    <p:extLst>
+      <p:ext uri="{BB962C8B-B14F-4D97-AF65-F5344CB8AC3E}">
+        <p14:creationId xmlns:p14="http://schemas.microsoft.com/office/powerpoint/2010/main" val="881537712"/>
+      </p:ext>
+    </p:extLst>
+  </p:cSld>
+  <p:clrMapOvr>
+    <a:masterClrMapping/>
+  </p:clrMapOvr>
+</p:sld>
+</file>
+
+<file path=ppt/slides/slide5.xml><?xml version="1.0" encoding="utf-8"?>
+<p:sld xmlns:a="http://schemas.openxmlformats.org/drawingml/2006/main" xmlns:r="http://schemas.openxmlformats.org/officeDocument/2006/relationships" xmlns:p="http://schemas.openxmlformats.org/presentationml/2006/main">
+  <p:cSld>
+    <p:spTree>
+      <p:nvGrpSpPr>
+        <p:cNvPr id="1" name=""/>
+        <p:cNvGrpSpPr/>
+        <p:nvPr/>
+      </p:nvGrpSpPr>
+      <p:grpSpPr>
+        <a:xfrm>
+          <a:off x="0" y="0"/>
+          <a:ext cx="0" cy="0"/>
+          <a:chOff x="0" y="0"/>
+          <a:chExt cx="0" cy="0"/>
+        </a:xfrm>
+      </p:grpSpPr>
+      <p:sp>
+        <p:nvSpPr>
+          <p:cNvPr id="4" name="foto09">
+            <a:extLst>
+              <a:ext uri="{FF2B5EF4-FFF2-40B4-BE49-F238E27FC236}">
+                <a16:creationId xmlns:a16="http://schemas.microsoft.com/office/drawing/2014/main" id="{AA5208A2-E831-C244-DB82-54F34E93E385}"/>
+              </a:ext>
+            </a:extLst>
+          </p:cNvPr>
+          <p:cNvSpPr>
+            <a:spLocks noGrp="1" noRot="1" noMove="1" noResize="1" noEditPoints="1" noAdjustHandles="1" noChangeArrowheads="1" noChangeShapeType="1"/>
+          </p:cNvSpPr>
+          <p:nvPr>
+            <p:ph type="pic" sz="quarter" idx="10"/>
+          </p:nvPr>
+        </p:nvSpPr>
+        <p:spPr/>
+      </p:sp>
+    </p:spTree>
+    <p:extLst>
+      <p:ext uri="{BB962C8B-B14F-4D97-AF65-F5344CB8AC3E}">
+        <p14:creationId xmlns:p14="http://schemas.microsoft.com/office/powerpoint/2010/main" val="3418154481"/>
       </p:ext>
     </p:extLst>
   </p:cSld>

</xml_diff>